<commit_message>
Update tensor docs. And remove the auto sync for getter and setter.
</commit_message>
<xml_diff>
--- a/docs/figs.pptx
+++ b/docs/figs.pptx
@@ -1484,7 +1484,7 @@
           <a:p>
             <a:fld id="{2A50C20C-7BED-4D85-BF56-B3E028E34684}" type="datetimeFigureOut">
               <a:rPr lang="fr-FR" smtClean="0"/>
-              <a:t>12/04/2021</a:t>
+              <a:t>07/05/2021</a:t>
             </a:fld>
             <a:endParaRPr lang="fr-FR"/>
           </a:p>
@@ -1654,7 +1654,7 @@
           <a:p>
             <a:fld id="{2A50C20C-7BED-4D85-BF56-B3E028E34684}" type="datetimeFigureOut">
               <a:rPr lang="fr-FR" smtClean="0"/>
-              <a:t>12/04/2021</a:t>
+              <a:t>07/05/2021</a:t>
             </a:fld>
             <a:endParaRPr lang="fr-FR"/>
           </a:p>
@@ -1834,7 +1834,7 @@
           <a:p>
             <a:fld id="{2A50C20C-7BED-4D85-BF56-B3E028E34684}" type="datetimeFigureOut">
               <a:rPr lang="fr-FR" smtClean="0"/>
-              <a:t>12/04/2021</a:t>
+              <a:t>07/05/2021</a:t>
             </a:fld>
             <a:endParaRPr lang="fr-FR"/>
           </a:p>
@@ -2004,7 +2004,7 @@
           <a:p>
             <a:fld id="{2A50C20C-7BED-4D85-BF56-B3E028E34684}" type="datetimeFigureOut">
               <a:rPr lang="fr-FR" smtClean="0"/>
-              <a:t>12/04/2021</a:t>
+              <a:t>07/05/2021</a:t>
             </a:fld>
             <a:endParaRPr lang="fr-FR"/>
           </a:p>
@@ -2250,7 +2250,7 @@
           <a:p>
             <a:fld id="{2A50C20C-7BED-4D85-BF56-B3E028E34684}" type="datetimeFigureOut">
               <a:rPr lang="fr-FR" smtClean="0"/>
-              <a:t>12/04/2021</a:t>
+              <a:t>07/05/2021</a:t>
             </a:fld>
             <a:endParaRPr lang="fr-FR"/>
           </a:p>
@@ -2482,7 +2482,7 @@
           <a:p>
             <a:fld id="{2A50C20C-7BED-4D85-BF56-B3E028E34684}" type="datetimeFigureOut">
               <a:rPr lang="fr-FR" smtClean="0"/>
-              <a:t>12/04/2021</a:t>
+              <a:t>07/05/2021</a:t>
             </a:fld>
             <a:endParaRPr lang="fr-FR"/>
           </a:p>
@@ -2849,7 +2849,7 @@
           <a:p>
             <a:fld id="{2A50C20C-7BED-4D85-BF56-B3E028E34684}" type="datetimeFigureOut">
               <a:rPr lang="fr-FR" smtClean="0"/>
-              <a:t>12/04/2021</a:t>
+              <a:t>07/05/2021</a:t>
             </a:fld>
             <a:endParaRPr lang="fr-FR"/>
           </a:p>
@@ -2967,7 +2967,7 @@
           <a:p>
             <a:fld id="{2A50C20C-7BED-4D85-BF56-B3E028E34684}" type="datetimeFigureOut">
               <a:rPr lang="fr-FR" smtClean="0"/>
-              <a:t>12/04/2021</a:t>
+              <a:t>07/05/2021</a:t>
             </a:fld>
             <a:endParaRPr lang="fr-FR"/>
           </a:p>
@@ -3062,7 +3062,7 @@
           <a:p>
             <a:fld id="{2A50C20C-7BED-4D85-BF56-B3E028E34684}" type="datetimeFigureOut">
               <a:rPr lang="fr-FR" smtClean="0"/>
-              <a:t>12/04/2021</a:t>
+              <a:t>07/05/2021</a:t>
             </a:fld>
             <a:endParaRPr lang="fr-FR"/>
           </a:p>
@@ -3339,7 +3339,7 @@
           <a:p>
             <a:fld id="{2A50C20C-7BED-4D85-BF56-B3E028E34684}" type="datetimeFigureOut">
               <a:rPr lang="fr-FR" smtClean="0"/>
-              <a:t>12/04/2021</a:t>
+              <a:t>07/05/2021</a:t>
             </a:fld>
             <a:endParaRPr lang="fr-FR"/>
           </a:p>
@@ -3592,7 +3592,7 @@
           <a:p>
             <a:fld id="{2A50C20C-7BED-4D85-BF56-B3E028E34684}" type="datetimeFigureOut">
               <a:rPr lang="fr-FR" smtClean="0"/>
-              <a:t>12/04/2021</a:t>
+              <a:t>07/05/2021</a:t>
             </a:fld>
             <a:endParaRPr lang="fr-FR"/>
           </a:p>
@@ -3805,7 +3805,7 @@
           <a:p>
             <a:fld id="{2A50C20C-7BED-4D85-BF56-B3E028E34684}" type="datetimeFigureOut">
               <a:rPr lang="fr-FR" smtClean="0"/>
-              <a:t>12/04/2021</a:t>
+              <a:t>07/05/2021</a:t>
             </a:fld>
             <a:endParaRPr lang="fr-FR"/>
           </a:p>

</xml_diff>

<commit_message>
Update documentation for n2d2.Tensor and add how to setup n2d2.
</commit_message>
<xml_diff>
--- a/docs/figs.pptx
+++ b/docs/figs.pptx
@@ -1484,7 +1484,7 @@
           <a:p>
             <a:fld id="{2A50C20C-7BED-4D85-BF56-B3E028E34684}" type="datetimeFigureOut">
               <a:rPr lang="fr-FR" smtClean="0"/>
-              <a:t>07/05/2021</a:t>
+              <a:t>05/07/2021</a:t>
             </a:fld>
             <a:endParaRPr lang="fr-FR"/>
           </a:p>
@@ -1654,7 +1654,7 @@
           <a:p>
             <a:fld id="{2A50C20C-7BED-4D85-BF56-B3E028E34684}" type="datetimeFigureOut">
               <a:rPr lang="fr-FR" smtClean="0"/>
-              <a:t>07/05/2021</a:t>
+              <a:t>05/07/2021</a:t>
             </a:fld>
             <a:endParaRPr lang="fr-FR"/>
           </a:p>
@@ -1834,7 +1834,7 @@
           <a:p>
             <a:fld id="{2A50C20C-7BED-4D85-BF56-B3E028E34684}" type="datetimeFigureOut">
               <a:rPr lang="fr-FR" smtClean="0"/>
-              <a:t>07/05/2021</a:t>
+              <a:t>05/07/2021</a:t>
             </a:fld>
             <a:endParaRPr lang="fr-FR"/>
           </a:p>
@@ -2004,7 +2004,7 @@
           <a:p>
             <a:fld id="{2A50C20C-7BED-4D85-BF56-B3E028E34684}" type="datetimeFigureOut">
               <a:rPr lang="fr-FR" smtClean="0"/>
-              <a:t>07/05/2021</a:t>
+              <a:t>05/07/2021</a:t>
             </a:fld>
             <a:endParaRPr lang="fr-FR"/>
           </a:p>
@@ -2250,7 +2250,7 @@
           <a:p>
             <a:fld id="{2A50C20C-7BED-4D85-BF56-B3E028E34684}" type="datetimeFigureOut">
               <a:rPr lang="fr-FR" smtClean="0"/>
-              <a:t>07/05/2021</a:t>
+              <a:t>05/07/2021</a:t>
             </a:fld>
             <a:endParaRPr lang="fr-FR"/>
           </a:p>
@@ -2482,7 +2482,7 @@
           <a:p>
             <a:fld id="{2A50C20C-7BED-4D85-BF56-B3E028E34684}" type="datetimeFigureOut">
               <a:rPr lang="fr-FR" smtClean="0"/>
-              <a:t>07/05/2021</a:t>
+              <a:t>05/07/2021</a:t>
             </a:fld>
             <a:endParaRPr lang="fr-FR"/>
           </a:p>
@@ -2849,7 +2849,7 @@
           <a:p>
             <a:fld id="{2A50C20C-7BED-4D85-BF56-B3E028E34684}" type="datetimeFigureOut">
               <a:rPr lang="fr-FR" smtClean="0"/>
-              <a:t>07/05/2021</a:t>
+              <a:t>05/07/2021</a:t>
             </a:fld>
             <a:endParaRPr lang="fr-FR"/>
           </a:p>
@@ -2967,7 +2967,7 @@
           <a:p>
             <a:fld id="{2A50C20C-7BED-4D85-BF56-B3E028E34684}" type="datetimeFigureOut">
               <a:rPr lang="fr-FR" smtClean="0"/>
-              <a:t>07/05/2021</a:t>
+              <a:t>05/07/2021</a:t>
             </a:fld>
             <a:endParaRPr lang="fr-FR"/>
           </a:p>
@@ -3062,7 +3062,7 @@
           <a:p>
             <a:fld id="{2A50C20C-7BED-4D85-BF56-B3E028E34684}" type="datetimeFigureOut">
               <a:rPr lang="fr-FR" smtClean="0"/>
-              <a:t>07/05/2021</a:t>
+              <a:t>05/07/2021</a:t>
             </a:fld>
             <a:endParaRPr lang="fr-FR"/>
           </a:p>
@@ -3339,7 +3339,7 @@
           <a:p>
             <a:fld id="{2A50C20C-7BED-4D85-BF56-B3E028E34684}" type="datetimeFigureOut">
               <a:rPr lang="fr-FR" smtClean="0"/>
-              <a:t>07/05/2021</a:t>
+              <a:t>05/07/2021</a:t>
             </a:fld>
             <a:endParaRPr lang="fr-FR"/>
           </a:p>
@@ -3592,7 +3592,7 @@
           <a:p>
             <a:fld id="{2A50C20C-7BED-4D85-BF56-B3E028E34684}" type="datetimeFigureOut">
               <a:rPr lang="fr-FR" smtClean="0"/>
-              <a:t>07/05/2021</a:t>
+              <a:t>05/07/2021</a:t>
             </a:fld>
             <a:endParaRPr lang="fr-FR"/>
           </a:p>
@@ -3805,7 +3805,7 @@
           <a:p>
             <a:fld id="{2A50C20C-7BED-4D85-BF56-B3E028E34684}" type="datetimeFigureOut">
               <a:rPr lang="fr-FR" smtClean="0"/>
-              <a:t>07/05/2021</a:t>
+              <a:t>05/07/2021</a:t>
             </a:fld>
             <a:endParaRPr lang="fr-FR"/>
           </a:p>
@@ -6044,6 +6044,389 @@
           <a:chExt cx="0" cy="0"/>
         </a:xfrm>
       </p:grpSpPr>
+      <p:sp>
+        <p:nvSpPr>
+          <p:cNvPr id="2" name="Ellipse 1"/>
+          <p:cNvSpPr/>
+          <p:nvPr/>
+        </p:nvSpPr>
+        <p:spPr>
+          <a:xfrm>
+            <a:off x="4817830" y="1001867"/>
+            <a:ext cx="1326444" cy="1281289"/>
+          </a:xfrm>
+          <a:prstGeom prst="ellipse">
+            <a:avLst/>
+          </a:prstGeom>
+          <a:gradFill flip="none" rotWithShape="1">
+            <a:gsLst>
+              <a:gs pos="0">
+                <a:srgbClr val="C00000">
+                  <a:shade val="30000"/>
+                  <a:satMod val="115000"/>
+                </a:srgbClr>
+              </a:gs>
+              <a:gs pos="50000">
+                <a:srgbClr val="C00000">
+                  <a:shade val="67500"/>
+                  <a:satMod val="115000"/>
+                </a:srgbClr>
+              </a:gs>
+              <a:gs pos="100000">
+                <a:srgbClr val="C00000">
+                  <a:shade val="100000"/>
+                  <a:satMod val="115000"/>
+                </a:srgbClr>
+              </a:gs>
+            </a:gsLst>
+            <a:lin ang="8100000" scaled="1"/>
+            <a:tileRect/>
+          </a:gradFill>
+          <a:ln>
+            <a:noFill/>
+          </a:ln>
+        </p:spPr>
+        <p:style>
+          <a:lnRef idx="0">
+            <a:scrgbClr r="0" g="0" b="0"/>
+          </a:lnRef>
+          <a:fillRef idx="0">
+            <a:scrgbClr r="0" g="0" b="0"/>
+          </a:fillRef>
+          <a:effectRef idx="0">
+            <a:scrgbClr r="0" g="0" b="0"/>
+          </a:effectRef>
+          <a:fontRef idx="minor">
+            <a:schemeClr val="lt1"/>
+          </a:fontRef>
+        </p:style>
+        <p:txBody>
+          <a:bodyPr rtlCol="0" anchor="ctr"/>
+          <a:lstStyle/>
+          <a:p>
+            <a:pPr algn="ctr"/>
+            <a:r>
+              <a:rPr lang="fr-FR" sz="3600" b="1" dirty="0" err="1" smtClean="0"/>
+              <a:t>Cell</a:t>
+            </a:r>
+            <a:endParaRPr lang="fr-FR" sz="3600" b="1" dirty="0" smtClean="0"/>
+          </a:p>
+        </p:txBody>
+      </p:sp>
+      <p:cxnSp>
+        <p:nvCxnSpPr>
+          <p:cNvPr id="3" name="Connecteur droit avec flèche 2"/>
+          <p:cNvCxnSpPr>
+            <a:stCxn id="2" idx="4"/>
+            <a:endCxn id="4" idx="0"/>
+          </p:cNvCxnSpPr>
+          <p:nvPr/>
+        </p:nvCxnSpPr>
+        <p:spPr>
+          <a:xfrm>
+            <a:off x="5481052" y="2283156"/>
+            <a:ext cx="0" cy="812800"/>
+          </a:xfrm>
+          <a:prstGeom prst="straightConnector1">
+            <a:avLst/>
+          </a:prstGeom>
+          <a:ln>
+            <a:tailEnd type="triangle"/>
+          </a:ln>
+        </p:spPr>
+        <p:style>
+          <a:lnRef idx="2">
+            <a:schemeClr val="dk1"/>
+          </a:lnRef>
+          <a:fillRef idx="0">
+            <a:schemeClr val="dk1"/>
+          </a:fillRef>
+          <a:effectRef idx="1">
+            <a:schemeClr val="dk1"/>
+          </a:effectRef>
+          <a:fontRef idx="minor">
+            <a:schemeClr val="tx1"/>
+          </a:fontRef>
+        </p:style>
+      </p:cxnSp>
+      <p:sp>
+        <p:nvSpPr>
+          <p:cNvPr id="4" name="Rectangle 3"/>
+          <p:cNvSpPr/>
+          <p:nvPr/>
+        </p:nvSpPr>
+        <p:spPr>
+          <a:xfrm>
+            <a:off x="4549718" y="3095956"/>
+            <a:ext cx="1862667" cy="948267"/>
+          </a:xfrm>
+          <a:prstGeom prst="rect">
+            <a:avLst/>
+          </a:prstGeom>
+          <a:gradFill flip="none" rotWithShape="1">
+            <a:gsLst>
+              <a:gs pos="0">
+                <a:srgbClr val="C00000">
+                  <a:shade val="30000"/>
+                  <a:satMod val="115000"/>
+                </a:srgbClr>
+              </a:gs>
+              <a:gs pos="50000">
+                <a:srgbClr val="C00000">
+                  <a:shade val="67500"/>
+                  <a:satMod val="115000"/>
+                </a:srgbClr>
+              </a:gs>
+              <a:gs pos="100000">
+                <a:srgbClr val="C00000">
+                  <a:shade val="100000"/>
+                  <a:satMod val="115000"/>
+                </a:srgbClr>
+              </a:gs>
+            </a:gsLst>
+            <a:lin ang="2700000" scaled="1"/>
+            <a:tileRect/>
+          </a:gradFill>
+          <a:ln>
+            <a:noFill/>
+          </a:ln>
+        </p:spPr>
+        <p:style>
+          <a:lnRef idx="0">
+            <a:scrgbClr r="0" g="0" b="0"/>
+          </a:lnRef>
+          <a:fillRef idx="0">
+            <a:scrgbClr r="0" g="0" b="0"/>
+          </a:fillRef>
+          <a:effectRef idx="0">
+            <a:scrgbClr r="0" g="0" b="0"/>
+          </a:effectRef>
+          <a:fontRef idx="minor">
+            <a:schemeClr val="lt1"/>
+          </a:fontRef>
+        </p:style>
+        <p:txBody>
+          <a:bodyPr rtlCol="0" anchor="ctr"/>
+          <a:lstStyle/>
+          <a:p>
+            <a:pPr algn="ctr"/>
+            <a:r>
+              <a:rPr lang="fr-FR" sz="3600" b="1" dirty="0" err="1" smtClean="0"/>
+              <a:t>Tensor</a:t>
+            </a:r>
+            <a:endParaRPr lang="fr-FR" sz="3600" b="1" dirty="0"/>
+          </a:p>
+        </p:txBody>
+      </p:sp>
+      <p:sp>
+        <p:nvSpPr>
+          <p:cNvPr id="5" name="Rectangle 4"/>
+          <p:cNvSpPr/>
+          <p:nvPr/>
+        </p:nvSpPr>
+        <p:spPr>
+          <a:xfrm>
+            <a:off x="4549718" y="4044223"/>
+            <a:ext cx="1862667" cy="575734"/>
+          </a:xfrm>
+          <a:prstGeom prst="rect">
+            <a:avLst/>
+          </a:prstGeom>
+          <a:solidFill>
+            <a:schemeClr val="accent3"/>
+          </a:solidFill>
+          <a:ln>
+            <a:noFill/>
+          </a:ln>
+        </p:spPr>
+        <p:style>
+          <a:lnRef idx="0">
+            <a:scrgbClr r="0" g="0" b="0"/>
+          </a:lnRef>
+          <a:fillRef idx="0">
+            <a:scrgbClr r="0" g="0" b="0"/>
+          </a:fillRef>
+          <a:effectRef idx="0">
+            <a:scrgbClr r="0" g="0" b="0"/>
+          </a:effectRef>
+          <a:fontRef idx="minor">
+            <a:schemeClr val="lt1"/>
+          </a:fontRef>
+        </p:style>
+        <p:txBody>
+          <a:bodyPr rtlCol="0" anchor="ctr"/>
+          <a:lstStyle/>
+          <a:p>
+            <a:r>
+              <a:rPr lang="fr-FR" sz="1600" dirty="0" smtClean="0"/>
+              <a:t>N2D2.Tensor</a:t>
+            </a:r>
+          </a:p>
+          <a:p>
+            <a:r>
+              <a:rPr lang="fr-FR" sz="1600" dirty="0" smtClean="0"/>
+              <a:t>n2d2.Cell</a:t>
+            </a:r>
+            <a:endParaRPr lang="fr-FR" sz="1600" dirty="0"/>
+          </a:p>
+        </p:txBody>
+      </p:sp>
+      <p:cxnSp>
+        <p:nvCxnSpPr>
+          <p:cNvPr id="6" name="Connecteur en angle 5"/>
+          <p:cNvCxnSpPr>
+            <a:stCxn id="7" idx="1"/>
+            <a:endCxn id="2" idx="2"/>
+          </p:cNvCxnSpPr>
+          <p:nvPr/>
+        </p:nvCxnSpPr>
+        <p:spPr>
+          <a:xfrm rot="10800000" flipH="1">
+            <a:off x="4597696" y="1642512"/>
+            <a:ext cx="220134" cy="2833512"/>
+          </a:xfrm>
+          <a:prstGeom prst="bentConnector3">
+            <a:avLst>
+              <a:gd name="adj1" fmla="val -103846"/>
+            </a:avLst>
+          </a:prstGeom>
+          <a:ln w="9525" cap="flat" cmpd="sng" algn="ctr">
+            <a:solidFill>
+              <a:schemeClr val="accent1"/>
+            </a:solidFill>
+            <a:prstDash val="lgDash"/>
+            <a:round/>
+            <a:headEnd type="none" w="med" len="med"/>
+            <a:tailEnd type="arrow" w="med" len="med"/>
+          </a:ln>
+        </p:spPr>
+        <p:style>
+          <a:lnRef idx="0">
+            <a:scrgbClr r="0" g="0" b="0"/>
+          </a:lnRef>
+          <a:fillRef idx="0">
+            <a:scrgbClr r="0" g="0" b="0"/>
+          </a:fillRef>
+          <a:effectRef idx="0">
+            <a:scrgbClr r="0" g="0" b="0"/>
+          </a:effectRef>
+          <a:fontRef idx="minor">
+            <a:schemeClr val="tx1"/>
+          </a:fontRef>
+        </p:style>
+      </p:cxnSp>
+      <p:sp>
+        <p:nvSpPr>
+          <p:cNvPr id="7" name="Rectangle 6"/>
+          <p:cNvSpPr/>
+          <p:nvPr/>
+        </p:nvSpPr>
+        <p:spPr>
+          <a:xfrm>
+            <a:off x="4597696" y="4332090"/>
+            <a:ext cx="883355" cy="287867"/>
+          </a:xfrm>
+          <a:prstGeom prst="rect">
+            <a:avLst/>
+          </a:prstGeom>
+          <a:noFill/>
+          <a:ln>
+            <a:noFill/>
+          </a:ln>
+        </p:spPr>
+        <p:style>
+          <a:lnRef idx="2">
+            <a:schemeClr val="accent1">
+              <a:shade val="50000"/>
+            </a:schemeClr>
+          </a:lnRef>
+          <a:fillRef idx="1">
+            <a:schemeClr val="accent1"/>
+          </a:fillRef>
+          <a:effectRef idx="0">
+            <a:schemeClr val="accent1"/>
+          </a:effectRef>
+          <a:fontRef idx="minor">
+            <a:schemeClr val="lt1"/>
+          </a:fontRef>
+        </p:style>
+        <p:txBody>
+          <a:bodyPr rtlCol="0" anchor="ctr"/>
+          <a:lstStyle/>
+          <a:p>
+            <a:pPr algn="ctr"/>
+            <a:endParaRPr lang="fr-FR"/>
+          </a:p>
+        </p:txBody>
+      </p:sp>
+      <p:sp>
+        <p:nvSpPr>
+          <p:cNvPr id="8" name="ZoneTexte 7"/>
+          <p:cNvSpPr txBox="1"/>
+          <p:nvPr/>
+        </p:nvSpPr>
+        <p:spPr>
+          <a:xfrm>
+            <a:off x="3271251" y="2808090"/>
+            <a:ext cx="1126783" cy="369332"/>
+          </a:xfrm>
+          <a:prstGeom prst="rect">
+            <a:avLst/>
+          </a:prstGeom>
+          <a:noFill/>
+        </p:spPr>
+        <p:txBody>
+          <a:bodyPr wrap="none" rtlCol="0">
+            <a:spAutoFit/>
+          </a:bodyPr>
+          <a:lstStyle/>
+          <a:p>
+            <a:r>
+              <a:rPr lang="fr-FR" dirty="0" smtClean="0">
+                <a:solidFill>
+                  <a:schemeClr val="accent1"/>
+                </a:solidFill>
+              </a:rPr>
+              <a:t>Reference</a:t>
+            </a:r>
+            <a:endParaRPr lang="fr-FR" dirty="0">
+              <a:solidFill>
+                <a:schemeClr val="accent1"/>
+              </a:solidFill>
+            </a:endParaRPr>
+          </a:p>
+        </p:txBody>
+      </p:sp>
+      <p:sp>
+        <p:nvSpPr>
+          <p:cNvPr id="9" name="ZoneTexte 8"/>
+          <p:cNvSpPr txBox="1"/>
+          <p:nvPr/>
+        </p:nvSpPr>
+        <p:spPr>
+          <a:xfrm>
+            <a:off x="5536414" y="2504890"/>
+            <a:ext cx="820609" cy="369332"/>
+          </a:xfrm>
+          <a:prstGeom prst="rect">
+            <a:avLst/>
+          </a:prstGeom>
+          <a:noFill/>
+        </p:spPr>
+        <p:txBody>
+          <a:bodyPr wrap="none" rtlCol="0">
+            <a:spAutoFit/>
+          </a:bodyPr>
+          <a:lstStyle/>
+          <a:p>
+            <a:r>
+              <a:rPr lang="fr-FR" dirty="0" smtClean="0"/>
+              <a:t>Return</a:t>
+            </a:r>
+            <a:endParaRPr lang="fr-FR" dirty="0"/>
+          </a:p>
+        </p:txBody>
+      </p:sp>
     </p:spTree>
     <p:extLst>
       <p:ext uri="{BB962C8B-B14F-4D97-AF65-F5344CB8AC3E}">

</xml_diff>

<commit_message>
Update interoperability with PyTorch n2d2.pytorch.Block is the only remaining way to interface. Update interoperability tests.
</commit_message>
<xml_diff>
--- a/docs/figs.pptx
+++ b/docs/figs.pptx
@@ -16,6 +16,7 @@
     <p:sldId id="265" r:id="rId10"/>
     <p:sldId id="266" r:id="rId11"/>
     <p:sldId id="264" r:id="rId12"/>
+    <p:sldId id="267" r:id="rId13"/>
   </p:sldIdLst>
   <p:sldSz cx="12192000" cy="6858000"/>
   <p:notesSz cx="6858000" cy="9144000"/>
@@ -1484,7 +1485,7 @@
           <a:p>
             <a:fld id="{2A50C20C-7BED-4D85-BF56-B3E028E34684}" type="datetimeFigureOut">
               <a:rPr lang="fr-FR" smtClean="0"/>
-              <a:t>05/07/2021</a:t>
+              <a:t>06/07/2021</a:t>
             </a:fld>
             <a:endParaRPr lang="fr-FR"/>
           </a:p>
@@ -1654,7 +1655,7 @@
           <a:p>
             <a:fld id="{2A50C20C-7BED-4D85-BF56-B3E028E34684}" type="datetimeFigureOut">
               <a:rPr lang="fr-FR" smtClean="0"/>
-              <a:t>05/07/2021</a:t>
+              <a:t>06/07/2021</a:t>
             </a:fld>
             <a:endParaRPr lang="fr-FR"/>
           </a:p>
@@ -1834,7 +1835,7 @@
           <a:p>
             <a:fld id="{2A50C20C-7BED-4D85-BF56-B3E028E34684}" type="datetimeFigureOut">
               <a:rPr lang="fr-FR" smtClean="0"/>
-              <a:t>05/07/2021</a:t>
+              <a:t>06/07/2021</a:t>
             </a:fld>
             <a:endParaRPr lang="fr-FR"/>
           </a:p>
@@ -2004,7 +2005,7 @@
           <a:p>
             <a:fld id="{2A50C20C-7BED-4D85-BF56-B3E028E34684}" type="datetimeFigureOut">
               <a:rPr lang="fr-FR" smtClean="0"/>
-              <a:t>05/07/2021</a:t>
+              <a:t>06/07/2021</a:t>
             </a:fld>
             <a:endParaRPr lang="fr-FR"/>
           </a:p>
@@ -2250,7 +2251,7 @@
           <a:p>
             <a:fld id="{2A50C20C-7BED-4D85-BF56-B3E028E34684}" type="datetimeFigureOut">
               <a:rPr lang="fr-FR" smtClean="0"/>
-              <a:t>05/07/2021</a:t>
+              <a:t>06/07/2021</a:t>
             </a:fld>
             <a:endParaRPr lang="fr-FR"/>
           </a:p>
@@ -2482,7 +2483,7 @@
           <a:p>
             <a:fld id="{2A50C20C-7BED-4D85-BF56-B3E028E34684}" type="datetimeFigureOut">
               <a:rPr lang="fr-FR" smtClean="0"/>
-              <a:t>05/07/2021</a:t>
+              <a:t>06/07/2021</a:t>
             </a:fld>
             <a:endParaRPr lang="fr-FR"/>
           </a:p>
@@ -2849,7 +2850,7 @@
           <a:p>
             <a:fld id="{2A50C20C-7BED-4D85-BF56-B3E028E34684}" type="datetimeFigureOut">
               <a:rPr lang="fr-FR" smtClean="0"/>
-              <a:t>05/07/2021</a:t>
+              <a:t>06/07/2021</a:t>
             </a:fld>
             <a:endParaRPr lang="fr-FR"/>
           </a:p>
@@ -2967,7 +2968,7 @@
           <a:p>
             <a:fld id="{2A50C20C-7BED-4D85-BF56-B3E028E34684}" type="datetimeFigureOut">
               <a:rPr lang="fr-FR" smtClean="0"/>
-              <a:t>05/07/2021</a:t>
+              <a:t>06/07/2021</a:t>
             </a:fld>
             <a:endParaRPr lang="fr-FR"/>
           </a:p>
@@ -3062,7 +3063,7 @@
           <a:p>
             <a:fld id="{2A50C20C-7BED-4D85-BF56-B3E028E34684}" type="datetimeFigureOut">
               <a:rPr lang="fr-FR" smtClean="0"/>
-              <a:t>05/07/2021</a:t>
+              <a:t>06/07/2021</a:t>
             </a:fld>
             <a:endParaRPr lang="fr-FR"/>
           </a:p>
@@ -3339,7 +3340,7 @@
           <a:p>
             <a:fld id="{2A50C20C-7BED-4D85-BF56-B3E028E34684}" type="datetimeFigureOut">
               <a:rPr lang="fr-FR" smtClean="0"/>
-              <a:t>05/07/2021</a:t>
+              <a:t>06/07/2021</a:t>
             </a:fld>
             <a:endParaRPr lang="fr-FR"/>
           </a:p>
@@ -3592,7 +3593,7 @@
           <a:p>
             <a:fld id="{2A50C20C-7BED-4D85-BF56-B3E028E34684}" type="datetimeFigureOut">
               <a:rPr lang="fr-FR" smtClean="0"/>
-              <a:t>05/07/2021</a:t>
+              <a:t>06/07/2021</a:t>
             </a:fld>
             <a:endParaRPr lang="fr-FR"/>
           </a:p>
@@ -3805,7 +3806,7 @@
           <a:p>
             <a:fld id="{2A50C20C-7BED-4D85-BF56-B3E028E34684}" type="datetimeFigureOut">
               <a:rPr lang="fr-FR" smtClean="0"/>
-              <a:t>05/07/2021</a:t>
+              <a:t>06/07/2021</a:t>
             </a:fld>
             <a:endParaRPr lang="fr-FR"/>
           </a:p>
@@ -4696,6 +4697,13 @@
   <p:clrMapOvr>
     <a:masterClrMapping/>
   </p:clrMapOvr>
+  <p:timing>
+    <p:tnLst>
+      <p:par>
+        <p:cTn id="1" dur="indefinite" restart="never" nodeType="tmRoot"/>
+      </p:par>
+    </p:tnLst>
+  </p:timing>
 </p:sld>
 </file>
 
@@ -6024,6 +6032,13 @@
   <p:clrMapOvr>
     <a:masterClrMapping/>
   </p:clrMapOvr>
+  <p:timing>
+    <p:tnLst>
+      <p:par>
+        <p:cTn id="1" dur="indefinite" restart="never" nodeType="tmRoot"/>
+      </p:par>
+    </p:tnLst>
+  </p:timing>
 </p:sld>
 </file>
 
@@ -6437,6 +6452,732 @@
   <p:clrMapOvr>
     <a:masterClrMapping/>
   </p:clrMapOvr>
+  <p:timing>
+    <p:tnLst>
+      <p:par>
+        <p:cTn id="1" dur="indefinite" restart="never" nodeType="tmRoot"/>
+      </p:par>
+    </p:tnLst>
+  </p:timing>
+</p:sld>
+</file>
+
+<file path=ppt/slides/slide12.xml><?xml version="1.0" encoding="utf-8"?>
+<p:sld xmlns:a="http://schemas.openxmlformats.org/drawingml/2006/main" xmlns:r="http://schemas.openxmlformats.org/officeDocument/2006/relationships" xmlns:p="http://schemas.openxmlformats.org/presentationml/2006/main">
+  <p:cSld>
+    <p:spTree>
+      <p:nvGrpSpPr>
+        <p:cNvPr id="1" name=""/>
+        <p:cNvGrpSpPr/>
+        <p:nvPr/>
+      </p:nvGrpSpPr>
+      <p:grpSpPr>
+        <a:xfrm>
+          <a:off x="0" y="0"/>
+          <a:ext cx="0" cy="0"/>
+          <a:chOff x="0" y="0"/>
+          <a:chExt cx="0" cy="0"/>
+        </a:xfrm>
+      </p:grpSpPr>
+      <p:sp>
+        <p:nvSpPr>
+          <p:cNvPr id="5" name="Rectangle 4"/>
+          <p:cNvSpPr/>
+          <p:nvPr/>
+        </p:nvSpPr>
+        <p:spPr>
+          <a:xfrm>
+            <a:off x="605567" y="2439417"/>
+            <a:ext cx="2057605" cy="557841"/>
+          </a:xfrm>
+          <a:prstGeom prst="rect">
+            <a:avLst/>
+          </a:prstGeom>
+          <a:ln>
+            <a:solidFill>
+              <a:schemeClr val="accent6">
+                <a:lumMod val="75000"/>
+              </a:schemeClr>
+            </a:solidFill>
+          </a:ln>
+        </p:spPr>
+        <p:style>
+          <a:lnRef idx="2">
+            <a:schemeClr val="dk1"/>
+          </a:lnRef>
+          <a:fillRef idx="1">
+            <a:schemeClr val="lt1"/>
+          </a:fillRef>
+          <a:effectRef idx="0">
+            <a:schemeClr val="dk1"/>
+          </a:effectRef>
+          <a:fontRef idx="minor">
+            <a:schemeClr val="dk1"/>
+          </a:fontRef>
+        </p:style>
+        <p:txBody>
+          <a:bodyPr rtlCol="0" anchor="ctr"/>
+          <a:lstStyle/>
+          <a:p>
+            <a:pPr algn="ctr"/>
+            <a:r>
+              <a:rPr lang="en-US" b="1" dirty="0" err="1" smtClean="0">
+                <a:solidFill>
+                  <a:schemeClr val="tx1"/>
+                </a:solidFill>
+                <a:latin typeface="Courier New" panose="02070309020205020404" pitchFamily="49" charset="0"/>
+                <a:cs typeface="Courier New" panose="02070309020205020404" pitchFamily="49" charset="0"/>
+              </a:rPr>
+              <a:t>DataProvider</a:t>
+            </a:r>
+            <a:endParaRPr lang="fr-FR" dirty="0" smtClean="0">
+              <a:solidFill>
+                <a:schemeClr val="accent5">
+                  <a:lumMod val="50000"/>
+                </a:schemeClr>
+              </a:solidFill>
+            </a:endParaRPr>
+          </a:p>
+        </p:txBody>
+      </p:sp>
+      <p:sp>
+        <p:nvSpPr>
+          <p:cNvPr id="6" name="Rectangle 5"/>
+          <p:cNvSpPr/>
+          <p:nvPr/>
+        </p:nvSpPr>
+        <p:spPr>
+          <a:xfrm>
+            <a:off x="9328255" y="2538600"/>
+            <a:ext cx="1775419" cy="379816"/>
+          </a:xfrm>
+          <a:prstGeom prst="rect">
+            <a:avLst/>
+          </a:prstGeom>
+          <a:ln>
+            <a:solidFill>
+              <a:schemeClr val="accent6">
+                <a:lumMod val="75000"/>
+              </a:schemeClr>
+            </a:solidFill>
+          </a:ln>
+        </p:spPr>
+        <p:style>
+          <a:lnRef idx="2">
+            <a:schemeClr val="dk1"/>
+          </a:lnRef>
+          <a:fillRef idx="1">
+            <a:schemeClr val="lt1"/>
+          </a:fillRef>
+          <a:effectRef idx="0">
+            <a:schemeClr val="dk1"/>
+          </a:effectRef>
+          <a:fontRef idx="minor">
+            <a:schemeClr val="dk1"/>
+          </a:fontRef>
+        </p:style>
+        <p:txBody>
+          <a:bodyPr rtlCol="0" anchor="ctr"/>
+          <a:lstStyle/>
+          <a:p>
+            <a:pPr algn="ctr"/>
+            <a:r>
+              <a:rPr lang="en-US" sz="2000" b="1" dirty="0" smtClean="0">
+                <a:solidFill>
+                  <a:schemeClr val="tx1"/>
+                </a:solidFill>
+                <a:latin typeface="Courier New" panose="02070309020205020404" pitchFamily="49" charset="0"/>
+                <a:cs typeface="Courier New" panose="02070309020205020404" pitchFamily="49" charset="0"/>
+              </a:rPr>
+              <a:t>Classifier</a:t>
+            </a:r>
+            <a:endParaRPr lang="fr-FR" sz="2000" dirty="0">
+              <a:solidFill>
+                <a:schemeClr val="accent5">
+                  <a:lumMod val="50000"/>
+                </a:schemeClr>
+              </a:solidFill>
+            </a:endParaRPr>
+          </a:p>
+        </p:txBody>
+      </p:sp>
+      <p:sp>
+        <p:nvSpPr>
+          <p:cNvPr id="7" name="ZoneTexte 6"/>
+          <p:cNvSpPr txBox="1"/>
+          <p:nvPr/>
+        </p:nvSpPr>
+        <p:spPr>
+          <a:xfrm>
+            <a:off x="5329363" y="2518306"/>
+            <a:ext cx="861892" cy="400110"/>
+          </a:xfrm>
+          <a:prstGeom prst="rect">
+            <a:avLst/>
+          </a:prstGeom>
+          <a:ln>
+            <a:solidFill>
+              <a:schemeClr val="accent6">
+                <a:lumMod val="75000"/>
+              </a:schemeClr>
+            </a:solidFill>
+          </a:ln>
+        </p:spPr>
+        <p:style>
+          <a:lnRef idx="2">
+            <a:schemeClr val="dk1"/>
+          </a:lnRef>
+          <a:fillRef idx="1">
+            <a:schemeClr val="lt1"/>
+          </a:fillRef>
+          <a:effectRef idx="0">
+            <a:schemeClr val="dk1"/>
+          </a:effectRef>
+          <a:fontRef idx="minor">
+            <a:schemeClr val="dk1"/>
+          </a:fontRef>
+        </p:style>
+        <p:txBody>
+          <a:bodyPr wrap="square" rtlCol="0">
+            <a:spAutoFit/>
+          </a:bodyPr>
+          <a:lstStyle/>
+          <a:p>
+            <a:pPr algn="ctr"/>
+            <a:r>
+              <a:rPr lang="en-US" sz="2000" b="1" dirty="0">
+                <a:solidFill>
+                  <a:schemeClr val="tx1"/>
+                </a:solidFill>
+                <a:latin typeface="Courier New" panose="02070309020205020404" pitchFamily="49" charset="0"/>
+                <a:cs typeface="Courier New" panose="02070309020205020404" pitchFamily="49" charset="0"/>
+              </a:rPr>
+              <a:t>Cell</a:t>
+            </a:r>
+            <a:endParaRPr lang="fr-FR" sz="2000" dirty="0">
+              <a:solidFill>
+                <a:schemeClr val="accent5">
+                  <a:lumMod val="50000"/>
+                </a:schemeClr>
+              </a:solidFill>
+            </a:endParaRPr>
+          </a:p>
+        </p:txBody>
+      </p:sp>
+      <p:cxnSp>
+        <p:nvCxnSpPr>
+          <p:cNvPr id="8" name="Connecteur droit avec flèche 7"/>
+          <p:cNvCxnSpPr>
+            <a:stCxn id="5" idx="3"/>
+            <a:endCxn id="16" idx="2"/>
+          </p:cNvCxnSpPr>
+          <p:nvPr/>
+        </p:nvCxnSpPr>
+        <p:spPr>
+          <a:xfrm>
+            <a:off x="2663172" y="2718338"/>
+            <a:ext cx="714789" cy="10170"/>
+          </a:xfrm>
+          <a:prstGeom prst="straightConnector1">
+            <a:avLst/>
+          </a:prstGeom>
+          <a:ln>
+            <a:solidFill>
+              <a:schemeClr val="accent6">
+                <a:lumMod val="75000"/>
+              </a:schemeClr>
+            </a:solidFill>
+            <a:tailEnd type="triangle"/>
+          </a:ln>
+        </p:spPr>
+        <p:style>
+          <a:lnRef idx="2">
+            <a:schemeClr val="dk1"/>
+          </a:lnRef>
+          <a:fillRef idx="0">
+            <a:schemeClr val="dk1"/>
+          </a:fillRef>
+          <a:effectRef idx="1">
+            <a:schemeClr val="dk1"/>
+          </a:effectRef>
+          <a:fontRef idx="minor">
+            <a:schemeClr val="tx1"/>
+          </a:fontRef>
+        </p:style>
+      </p:cxnSp>
+      <p:cxnSp>
+        <p:nvCxnSpPr>
+          <p:cNvPr id="9" name="Connecteur droit avec flèche 8"/>
+          <p:cNvCxnSpPr>
+            <a:stCxn id="7" idx="3"/>
+            <a:endCxn id="17" idx="2"/>
+          </p:cNvCxnSpPr>
+          <p:nvPr/>
+        </p:nvCxnSpPr>
+        <p:spPr>
+          <a:xfrm flipV="1">
+            <a:off x="6191255" y="2717160"/>
+            <a:ext cx="583250" cy="1201"/>
+          </a:xfrm>
+          <a:prstGeom prst="straightConnector1">
+            <a:avLst/>
+          </a:prstGeom>
+          <a:ln>
+            <a:solidFill>
+              <a:schemeClr val="accent6">
+                <a:lumMod val="75000"/>
+              </a:schemeClr>
+            </a:solidFill>
+            <a:tailEnd type="triangle"/>
+          </a:ln>
+        </p:spPr>
+        <p:style>
+          <a:lnRef idx="2">
+            <a:schemeClr val="dk1"/>
+          </a:lnRef>
+          <a:fillRef idx="0">
+            <a:schemeClr val="dk1"/>
+          </a:fillRef>
+          <a:effectRef idx="1">
+            <a:schemeClr val="dk1"/>
+          </a:effectRef>
+          <a:fontRef idx="minor">
+            <a:schemeClr val="tx1"/>
+          </a:fontRef>
+        </p:style>
+      </p:cxnSp>
+      <p:cxnSp>
+        <p:nvCxnSpPr>
+          <p:cNvPr id="13" name="Connecteur droit avec flèche 12"/>
+          <p:cNvCxnSpPr>
+            <a:stCxn id="16" idx="6"/>
+            <a:endCxn id="7" idx="1"/>
+          </p:cNvCxnSpPr>
+          <p:nvPr/>
+        </p:nvCxnSpPr>
+        <p:spPr>
+          <a:xfrm flipV="1">
+            <a:off x="4823103" y="2718361"/>
+            <a:ext cx="506260" cy="10147"/>
+          </a:xfrm>
+          <a:prstGeom prst="straightConnector1">
+            <a:avLst/>
+          </a:prstGeom>
+          <a:ln>
+            <a:solidFill>
+              <a:schemeClr val="accent6">
+                <a:lumMod val="75000"/>
+              </a:schemeClr>
+            </a:solidFill>
+            <a:tailEnd type="triangle"/>
+          </a:ln>
+        </p:spPr>
+        <p:style>
+          <a:lnRef idx="2">
+            <a:schemeClr val="dk1"/>
+          </a:lnRef>
+          <a:fillRef idx="0">
+            <a:schemeClr val="dk1"/>
+          </a:fillRef>
+          <a:effectRef idx="1">
+            <a:schemeClr val="dk1"/>
+          </a:effectRef>
+          <a:fontRef idx="minor">
+            <a:schemeClr val="tx1"/>
+          </a:fontRef>
+        </p:style>
+      </p:cxnSp>
+      <p:cxnSp>
+        <p:nvCxnSpPr>
+          <p:cNvPr id="14" name="Connecteur droit avec flèche 13"/>
+          <p:cNvCxnSpPr>
+            <a:stCxn id="17" idx="6"/>
+            <a:endCxn id="6" idx="1"/>
+          </p:cNvCxnSpPr>
+          <p:nvPr/>
+        </p:nvCxnSpPr>
+        <p:spPr>
+          <a:xfrm>
+            <a:off x="8282681" y="2717160"/>
+            <a:ext cx="1045574" cy="11348"/>
+          </a:xfrm>
+          <a:prstGeom prst="straightConnector1">
+            <a:avLst/>
+          </a:prstGeom>
+          <a:ln>
+            <a:solidFill>
+              <a:schemeClr val="accent6">
+                <a:lumMod val="75000"/>
+              </a:schemeClr>
+            </a:solidFill>
+            <a:tailEnd type="triangle"/>
+          </a:ln>
+        </p:spPr>
+        <p:style>
+          <a:lnRef idx="2">
+            <a:schemeClr val="dk1"/>
+          </a:lnRef>
+          <a:fillRef idx="0">
+            <a:schemeClr val="dk1"/>
+          </a:fillRef>
+          <a:effectRef idx="1">
+            <a:schemeClr val="dk1"/>
+          </a:effectRef>
+          <a:fontRef idx="minor">
+            <a:schemeClr val="tx1"/>
+          </a:fontRef>
+        </p:style>
+      </p:cxnSp>
+      <p:cxnSp>
+        <p:nvCxnSpPr>
+          <p:cNvPr id="15" name="Connecteur en angle 14"/>
+          <p:cNvCxnSpPr>
+            <a:endCxn id="7" idx="1"/>
+          </p:cNvCxnSpPr>
+          <p:nvPr/>
+        </p:nvCxnSpPr>
+        <p:spPr>
+          <a:xfrm rot="10800000" flipV="1">
+            <a:off x="5329363" y="2717159"/>
+            <a:ext cx="2935200" cy="1202"/>
+          </a:xfrm>
+          <a:prstGeom prst="bentConnector5">
+            <a:avLst>
+              <a:gd name="adj1" fmla="val 35318"/>
+              <a:gd name="adj2" fmla="val 35761814"/>
+              <a:gd name="adj3" fmla="val 107788"/>
+            </a:avLst>
+          </a:prstGeom>
+          <a:ln>
+            <a:solidFill>
+              <a:schemeClr val="accent6">
+                <a:lumMod val="75000"/>
+              </a:schemeClr>
+            </a:solidFill>
+          </a:ln>
+        </p:spPr>
+        <p:style>
+          <a:lnRef idx="2">
+            <a:schemeClr val="dk1"/>
+          </a:lnRef>
+          <a:fillRef idx="0">
+            <a:schemeClr val="dk1"/>
+          </a:fillRef>
+          <a:effectRef idx="1">
+            <a:schemeClr val="dk1"/>
+          </a:effectRef>
+          <a:fontRef idx="minor">
+            <a:schemeClr val="tx1"/>
+          </a:fontRef>
+        </p:style>
+      </p:cxnSp>
+      <p:sp>
+        <p:nvSpPr>
+          <p:cNvPr id="16" name="Ellipse 15"/>
+          <p:cNvSpPr/>
+          <p:nvPr/>
+        </p:nvSpPr>
+        <p:spPr>
+          <a:xfrm>
+            <a:off x="3377961" y="2440476"/>
+            <a:ext cx="1445142" cy="576064"/>
+          </a:xfrm>
+          <a:prstGeom prst="ellipse">
+            <a:avLst/>
+          </a:prstGeom>
+          <a:ln>
+            <a:solidFill>
+              <a:schemeClr val="accent6">
+                <a:lumMod val="75000"/>
+              </a:schemeClr>
+            </a:solidFill>
+          </a:ln>
+        </p:spPr>
+        <p:style>
+          <a:lnRef idx="2">
+            <a:schemeClr val="dk1"/>
+          </a:lnRef>
+          <a:fillRef idx="1">
+            <a:schemeClr val="lt1"/>
+          </a:fillRef>
+          <a:effectRef idx="0">
+            <a:schemeClr val="dk1"/>
+          </a:effectRef>
+          <a:fontRef idx="minor">
+            <a:schemeClr val="dk1"/>
+          </a:fontRef>
+        </p:style>
+        <p:txBody>
+          <a:bodyPr rtlCol="0" anchor="ctr"/>
+          <a:lstStyle/>
+          <a:p>
+            <a:pPr algn="ctr"/>
+            <a:r>
+              <a:rPr lang="en-US" b="1" dirty="0" smtClean="0">
+                <a:solidFill>
+                  <a:schemeClr val="tx1"/>
+                </a:solidFill>
+                <a:latin typeface="Courier New" panose="02070309020205020404" pitchFamily="49" charset="0"/>
+                <a:cs typeface="Courier New" panose="02070309020205020404" pitchFamily="49" charset="0"/>
+              </a:rPr>
+              <a:t>Tensor</a:t>
+            </a:r>
+            <a:endParaRPr lang="fr-FR" dirty="0">
+              <a:solidFill>
+                <a:schemeClr val="accent5">
+                  <a:lumMod val="50000"/>
+                </a:schemeClr>
+              </a:solidFill>
+            </a:endParaRPr>
+          </a:p>
+        </p:txBody>
+      </p:sp>
+      <p:sp>
+        <p:nvSpPr>
+          <p:cNvPr id="17" name="Ellipse 16"/>
+          <p:cNvSpPr/>
+          <p:nvPr/>
+        </p:nvSpPr>
+        <p:spPr>
+          <a:xfrm>
+            <a:off x="6774505" y="2429128"/>
+            <a:ext cx="1508176" cy="576064"/>
+          </a:xfrm>
+          <a:prstGeom prst="ellipse">
+            <a:avLst/>
+          </a:prstGeom>
+          <a:ln>
+            <a:solidFill>
+              <a:schemeClr val="accent6">
+                <a:lumMod val="75000"/>
+              </a:schemeClr>
+            </a:solidFill>
+          </a:ln>
+        </p:spPr>
+        <p:style>
+          <a:lnRef idx="2">
+            <a:schemeClr val="dk1"/>
+          </a:lnRef>
+          <a:fillRef idx="1">
+            <a:schemeClr val="lt1"/>
+          </a:fillRef>
+          <a:effectRef idx="0">
+            <a:schemeClr val="dk1"/>
+          </a:effectRef>
+          <a:fontRef idx="minor">
+            <a:schemeClr val="dk1"/>
+          </a:fontRef>
+        </p:style>
+        <p:txBody>
+          <a:bodyPr rtlCol="0" anchor="ctr"/>
+          <a:lstStyle/>
+          <a:p>
+            <a:pPr algn="ctr"/>
+            <a:r>
+              <a:rPr lang="en-US" b="1" dirty="0">
+                <a:solidFill>
+                  <a:schemeClr val="tx1"/>
+                </a:solidFill>
+                <a:latin typeface="Courier New" panose="02070309020205020404" pitchFamily="49" charset="0"/>
+                <a:cs typeface="Courier New" panose="02070309020205020404" pitchFamily="49" charset="0"/>
+              </a:rPr>
+              <a:t>Tensor</a:t>
+            </a:r>
+            <a:endParaRPr lang="fr-FR" dirty="0">
+              <a:solidFill>
+                <a:schemeClr val="accent5">
+                  <a:lumMod val="50000"/>
+                </a:schemeClr>
+              </a:solidFill>
+            </a:endParaRPr>
+          </a:p>
+        </p:txBody>
+      </p:sp>
+      <p:sp>
+        <p:nvSpPr>
+          <p:cNvPr id="24" name="ZoneTexte 23"/>
+          <p:cNvSpPr txBox="1"/>
+          <p:nvPr/>
+        </p:nvSpPr>
+        <p:spPr>
+          <a:xfrm>
+            <a:off x="1199794" y="1612545"/>
+            <a:ext cx="869149" cy="461665"/>
+          </a:xfrm>
+          <a:prstGeom prst="rect">
+            <a:avLst/>
+          </a:prstGeom>
+          <a:noFill/>
+        </p:spPr>
+        <p:txBody>
+          <a:bodyPr wrap="none" rtlCol="0">
+            <a:spAutoFit/>
+          </a:bodyPr>
+          <a:lstStyle/>
+          <a:p>
+            <a:r>
+              <a:rPr lang="fr-FR" sz="2400" b="1" dirty="0" smtClean="0"/>
+              <a:t>Input</a:t>
+            </a:r>
+            <a:endParaRPr lang="fr-FR" sz="2400" b="1" dirty="0"/>
+          </a:p>
+        </p:txBody>
+      </p:sp>
+      <p:sp>
+        <p:nvSpPr>
+          <p:cNvPr id="25" name="ZoneTexte 24"/>
+          <p:cNvSpPr txBox="1"/>
+          <p:nvPr/>
+        </p:nvSpPr>
+        <p:spPr>
+          <a:xfrm>
+            <a:off x="9664370" y="1612544"/>
+            <a:ext cx="1103187" cy="461665"/>
+          </a:xfrm>
+          <a:prstGeom prst="rect">
+            <a:avLst/>
+          </a:prstGeom>
+          <a:noFill/>
+        </p:spPr>
+        <p:txBody>
+          <a:bodyPr wrap="none" rtlCol="0">
+            <a:spAutoFit/>
+          </a:bodyPr>
+          <a:lstStyle/>
+          <a:p>
+            <a:r>
+              <a:rPr lang="fr-FR" sz="2400" b="1" dirty="0" smtClean="0"/>
+              <a:t>Output</a:t>
+            </a:r>
+            <a:endParaRPr lang="fr-FR" sz="2400" b="1" dirty="0"/>
+          </a:p>
+        </p:txBody>
+      </p:sp>
+      <p:sp>
+        <p:nvSpPr>
+          <p:cNvPr id="26" name="ZoneTexte 25"/>
+          <p:cNvSpPr txBox="1"/>
+          <p:nvPr/>
+        </p:nvSpPr>
+        <p:spPr>
+          <a:xfrm>
+            <a:off x="5046268" y="1612544"/>
+            <a:ext cx="1436612" cy="461665"/>
+          </a:xfrm>
+          <a:prstGeom prst="rect">
+            <a:avLst/>
+          </a:prstGeom>
+          <a:noFill/>
+        </p:spPr>
+        <p:txBody>
+          <a:bodyPr wrap="none" rtlCol="0">
+            <a:spAutoFit/>
+          </a:bodyPr>
+          <a:lstStyle/>
+          <a:p>
+            <a:r>
+              <a:rPr lang="fr-FR" sz="2400" b="1" dirty="0" err="1" smtClean="0"/>
+              <a:t>Backbone</a:t>
+            </a:r>
+            <a:endParaRPr lang="fr-FR" sz="2400" b="1" dirty="0"/>
+          </a:p>
+        </p:txBody>
+      </p:sp>
+      <p:cxnSp>
+        <p:nvCxnSpPr>
+          <p:cNvPr id="28" name="Connecteur droit 27"/>
+          <p:cNvCxnSpPr/>
+          <p:nvPr/>
+        </p:nvCxnSpPr>
+        <p:spPr>
+          <a:xfrm>
+            <a:off x="3166036" y="1710267"/>
+            <a:ext cx="497" cy="2057400"/>
+          </a:xfrm>
+          <a:prstGeom prst="line">
+            <a:avLst/>
+          </a:prstGeom>
+          <a:ln w="9525" cap="flat" cmpd="sng" algn="ctr">
+            <a:solidFill>
+              <a:schemeClr val="dk1"/>
+            </a:solidFill>
+            <a:prstDash val="dash"/>
+            <a:round/>
+            <a:headEnd type="none" w="med" len="med"/>
+            <a:tailEnd type="none" w="med" len="med"/>
+          </a:ln>
+        </p:spPr>
+        <p:style>
+          <a:lnRef idx="0">
+            <a:scrgbClr r="0" g="0" b="0"/>
+          </a:lnRef>
+          <a:fillRef idx="0">
+            <a:scrgbClr r="0" g="0" b="0"/>
+          </a:fillRef>
+          <a:effectRef idx="0">
+            <a:scrgbClr r="0" g="0" b="0"/>
+          </a:effectRef>
+          <a:fontRef idx="minor">
+            <a:schemeClr val="tx1"/>
+          </a:fontRef>
+        </p:style>
+      </p:cxnSp>
+      <p:cxnSp>
+        <p:nvCxnSpPr>
+          <p:cNvPr id="75" name="Connecteur droit 74"/>
+          <p:cNvCxnSpPr/>
+          <p:nvPr/>
+        </p:nvCxnSpPr>
+        <p:spPr>
+          <a:xfrm>
+            <a:off x="8714142" y="1612544"/>
+            <a:ext cx="497" cy="2057400"/>
+          </a:xfrm>
+          <a:prstGeom prst="line">
+            <a:avLst/>
+          </a:prstGeom>
+          <a:ln w="9525" cap="flat" cmpd="sng" algn="ctr">
+            <a:solidFill>
+              <a:schemeClr val="dk1"/>
+            </a:solidFill>
+            <a:prstDash val="dash"/>
+            <a:round/>
+            <a:headEnd type="none" w="med" len="med"/>
+            <a:tailEnd type="none" w="med" len="med"/>
+          </a:ln>
+        </p:spPr>
+        <p:style>
+          <a:lnRef idx="0">
+            <a:scrgbClr r="0" g="0" b="0"/>
+          </a:lnRef>
+          <a:fillRef idx="0">
+            <a:scrgbClr r="0" g="0" b="0"/>
+          </a:fillRef>
+          <a:effectRef idx="0">
+            <a:scrgbClr r="0" g="0" b="0"/>
+          </a:effectRef>
+          <a:fontRef idx="minor">
+            <a:schemeClr val="tx1"/>
+          </a:fontRef>
+        </p:style>
+      </p:cxnSp>
+    </p:spTree>
+    <p:extLst>
+      <p:ext uri="{BB962C8B-B14F-4D97-AF65-F5344CB8AC3E}">
+        <p14:creationId xmlns:p14="http://schemas.microsoft.com/office/powerpoint/2010/main" val="409650133"/>
+      </p:ext>
+    </p:extLst>
+  </p:cSld>
+  <p:clrMapOvr>
+    <a:masterClrMapping/>
+  </p:clrMapOvr>
+  <p:timing>
+    <p:tnLst>
+      <p:par>
+        <p:cTn id="1" dur="indefinite" restart="never" nodeType="tmRoot"/>
+      </p:par>
+    </p:tnLst>
+  </p:timing>
 </p:sld>
 </file>
 
@@ -6686,6 +7427,13 @@
   <p:clrMapOvr>
     <a:masterClrMapping/>
   </p:clrMapOvr>
+  <p:timing>
+    <p:tnLst>
+      <p:par>
+        <p:cTn id="1" dur="indefinite" restart="never" nodeType="tmRoot"/>
+      </p:par>
+    </p:tnLst>
+  </p:timing>
 </p:sld>
 </file>
 
@@ -13303,6 +14051,13 @@
   <p:clrMapOvr>
     <a:masterClrMapping/>
   </p:clrMapOvr>
+  <p:timing>
+    <p:tnLst>
+      <p:par>
+        <p:cTn id="1" dur="indefinite" restart="never" nodeType="tmRoot"/>
+      </p:par>
+    </p:tnLst>
+  </p:timing>
 </p:sld>
 </file>
 
@@ -15296,6 +16051,13 @@
   <p:clrMapOvr>
     <a:masterClrMapping/>
   </p:clrMapOvr>
+  <p:timing>
+    <p:tnLst>
+      <p:par>
+        <p:cTn id="1" dur="indefinite" restart="never" nodeType="tmRoot"/>
+      </p:par>
+    </p:tnLst>
+  </p:timing>
 </p:sld>
 </file>
 
@@ -15734,6 +16496,13 @@
   <p:clrMapOvr>
     <a:masterClrMapping/>
   </p:clrMapOvr>
+  <p:timing>
+    <p:tnLst>
+      <p:par>
+        <p:cTn id="1" dur="indefinite" restart="never" nodeType="tmRoot"/>
+      </p:par>
+    </p:tnLst>
+  </p:timing>
 </p:sld>
 </file>
 
@@ -16194,6 +16963,13 @@
   <p:clrMapOvr>
     <a:masterClrMapping/>
   </p:clrMapOvr>
+  <p:timing>
+    <p:tnLst>
+      <p:par>
+        <p:cTn id="1" dur="indefinite" restart="never" nodeType="tmRoot"/>
+      </p:par>
+    </p:tnLst>
+  </p:timing>
 </p:sld>
 </file>
 
@@ -19405,6 +20181,13 @@
   <p:clrMapOvr>
     <a:masterClrMapping/>
   </p:clrMapOvr>
+  <p:timing>
+    <p:tnLst>
+      <p:par>
+        <p:cTn id="1" dur="indefinite" restart="never" nodeType="tmRoot"/>
+      </p:par>
+    </p:tnLst>
+  </p:timing>
 </p:sld>
 </file>
 
@@ -21029,6 +21812,13 @@
   <p:clrMapOvr>
     <a:masterClrMapping/>
   </p:clrMapOvr>
+  <p:timing>
+    <p:tnLst>
+      <p:par>
+        <p:cTn id="1" dur="indefinite" restart="never" nodeType="tmRoot"/>
+      </p:par>
+    </p:tnLst>
+  </p:timing>
 </p:sld>
 </file>
 
@@ -23724,6 +24514,13 @@
   <p:clrMapOvr>
     <a:masterClrMapping/>
   </p:clrMapOvr>
+  <p:timing>
+    <p:tnLst>
+      <p:par>
+        <p:cTn id="1" dur="indefinite" restart="never" nodeType="tmRoot"/>
+      </p:par>
+    </p:tnLst>
+  </p:timing>
 </p:sld>
 </file>
 

</xml_diff>